<commit_message>
Complete version of the presentation
Including Statistical Modeling, Results, Conclusion, and Future Work
</commit_message>
<xml_diff>
--- a/group14.pptx
+++ b/group14.pptx
@@ -6,10 +6,10 @@
     <p:sldMasterId id="2147484193" r:id="rId2"/>
   </p:sldMasterIdLst>
   <p:notesMasterIdLst>
-    <p:notesMasterId r:id="rId14"/>
+    <p:notesMasterId r:id="rId15"/>
   </p:notesMasterIdLst>
   <p:handoutMasterIdLst>
-    <p:handoutMasterId r:id="rId15"/>
+    <p:handoutMasterId r:id="rId16"/>
   </p:handoutMasterIdLst>
   <p:sldIdLst>
     <p:sldId id="1644" r:id="rId3"/>
@@ -23,6 +23,7 @@
     <p:sldId id="1656" r:id="rId11"/>
     <p:sldId id="1661" r:id="rId12"/>
     <p:sldId id="2129" r:id="rId13"/>
+    <p:sldId id="2136" r:id="rId14"/>
   </p:sldIdLst>
   <p:sldSz cx="9144000" cy="5143500" type="screen16x9"/>
   <p:notesSz cx="6858000" cy="9144000"/>
@@ -2485,7 +2486,7 @@
               <a:rPr lang="en-US" sz="1600" dirty="0">
                 <a:latin typeface="+mj-lt"/>
               </a:rPr>
-              <a:t>Jia Niu, Xiaolin Feng ,Tianrui Xie, Zhilin Liu, </a:t>
+              <a:t>Jia Niu, Xiaolin Feng, Tianrui Xie, Zhilin Liu, </a:t>
             </a:r>
             <a:r>
               <a:rPr lang="en-US" sz="1600" dirty="0" err="1">
@@ -7237,6 +7238,607 @@
   <p:transition spd="slow">
     <p:push dir="u"/>
   </p:transition>
+</p:sld>
+</file>
+
+<file path=ppt/slides/slide12.xml><?xml version="1.0" encoding="utf-8"?>
+<p:sld xmlns:a="http://schemas.openxmlformats.org/drawingml/2006/main" xmlns:r="http://schemas.openxmlformats.org/officeDocument/2006/relationships" xmlns:p="http://schemas.openxmlformats.org/presentationml/2006/main">
+  <p:cSld>
+    <p:spTree>
+      <p:nvGrpSpPr>
+        <p:cNvPr id="1" name="">
+          <a:extLst>
+            <a:ext uri="{FF2B5EF4-FFF2-40B4-BE49-F238E27FC236}">
+              <a16:creationId xmlns:a16="http://schemas.microsoft.com/office/drawing/2014/main" id="{CFAE6340-0F48-FAAD-5A3E-98FD74480D2C}"/>
+            </a:ext>
+          </a:extLst>
+        </p:cNvPr>
+        <p:cNvGrpSpPr/>
+        <p:nvPr/>
+      </p:nvGrpSpPr>
+      <p:grpSpPr>
+        <a:xfrm>
+          <a:off x="0" y="0"/>
+          <a:ext cx="0" cy="0"/>
+          <a:chOff x="0" y="0"/>
+          <a:chExt cx="0" cy="0"/>
+        </a:xfrm>
+      </p:grpSpPr>
+      <p:sp>
+        <p:nvSpPr>
+          <p:cNvPr id="3" name="Rectangle 2">
+            <a:extLst>
+              <a:ext uri="{FF2B5EF4-FFF2-40B4-BE49-F238E27FC236}">
+                <a16:creationId xmlns:a16="http://schemas.microsoft.com/office/drawing/2014/main" id="{EE7E5C62-E810-D877-4413-1019AEBFEE83}"/>
+              </a:ext>
+            </a:extLst>
+          </p:cNvPr>
+          <p:cNvSpPr/>
+          <p:nvPr/>
+        </p:nvSpPr>
+        <p:spPr bwMode="auto">
+          <a:xfrm>
+            <a:off x="398834" y="258755"/>
+            <a:ext cx="8398214" cy="4435813"/>
+          </a:xfrm>
+          <a:prstGeom prst="rect">
+            <a:avLst/>
+          </a:prstGeom>
+          <a:solidFill>
+            <a:srgbClr val="003864"/>
+          </a:solidFill>
+          <a:ln w="9525">
+            <a:noFill/>
+            <a:round/>
+            <a:headEnd/>
+            <a:tailEnd/>
+          </a:ln>
+        </p:spPr>
+        <p:txBody>
+          <a:bodyPr vert="horz" wrap="square" lIns="91440" tIns="45720" rIns="91440" bIns="45720" numCol="1" rtlCol="0" anchor="t" anchorCtr="0" compatLnSpc="1">
+            <a:prstTxWarp prst="textNoShape">
+              <a:avLst/>
+            </a:prstTxWarp>
+          </a:bodyPr>
+          <a:lstStyle/>
+          <a:p>
+            <a:pPr algn="ctr"/>
+            <a:endParaRPr lang="en-US" dirty="0"/>
+          </a:p>
+        </p:txBody>
+      </p:sp>
+      <p:sp>
+        <p:nvSpPr>
+          <p:cNvPr id="4" name="Title 2">
+            <a:extLst>
+              <a:ext uri="{FF2B5EF4-FFF2-40B4-BE49-F238E27FC236}">
+                <a16:creationId xmlns:a16="http://schemas.microsoft.com/office/drawing/2014/main" id="{6E039874-3571-2386-62FC-DE29A972B2A5}"/>
+              </a:ext>
+            </a:extLst>
+          </p:cNvPr>
+          <p:cNvSpPr txBox="1">
+            <a:spLocks/>
+          </p:cNvSpPr>
+          <p:nvPr/>
+        </p:nvSpPr>
+        <p:spPr>
+          <a:xfrm>
+            <a:off x="762000" y="1824395"/>
+            <a:ext cx="7772400" cy="1107996"/>
+          </a:xfrm>
+          <a:prstGeom prst="rect">
+            <a:avLst/>
+          </a:prstGeom>
+        </p:spPr>
+        <p:txBody>
+          <a:bodyPr wrap="square" lIns="0" tIns="0" rIns="0" bIns="0" anchor="ctr">
+            <a:spAutoFit/>
+          </a:bodyPr>
+          <a:lstStyle>
+            <a:lvl1pPr algn="ctr" defTabSz="914400" rtl="0" eaLnBrk="1" latinLnBrk="0" hangingPunct="1">
+              <a:spcBef>
+                <a:spcPct val="0"/>
+              </a:spcBef>
+              <a:buNone/>
+              <a:defRPr sz="4400" kern="1200">
+                <a:solidFill>
+                  <a:schemeClr val="tx1"/>
+                </a:solidFill>
+                <a:latin typeface="+mj-lt"/>
+                <a:ea typeface="+mj-ea"/>
+                <a:cs typeface="+mj-cs"/>
+              </a:defRPr>
+            </a:lvl1pPr>
+          </a:lstStyle>
+          <a:p>
+            <a:r>
+              <a:rPr lang="en-US" altLang="zh-CN" sz="4000" dirty="0">
+                <a:solidFill>
+                  <a:schemeClr val="bg1"/>
+                </a:solidFill>
+              </a:rPr>
+              <a:t>Thanks for your attention!</a:t>
+            </a:r>
+            <a:br>
+              <a:rPr lang="en-US" sz="3200" dirty="0">
+                <a:solidFill>
+                  <a:schemeClr val="bg1"/>
+                </a:solidFill>
+                <a:effectLst>
+                  <a:outerShdw blurRad="60007" dist="310007" dir="7680000" sy="30000" kx="1300200" algn="ctr" rotWithShape="0">
+                    <a:prstClr val="black">
+                      <a:alpha val="13000"/>
+                    </a:prstClr>
+                  </a:outerShdw>
+                </a:effectLst>
+              </a:rPr>
+            </a:br>
+            <a:endParaRPr lang="en-US" sz="3200" b="1" dirty="0">
+              <a:solidFill>
+                <a:schemeClr val="bg1"/>
+              </a:solidFill>
+              <a:effectLst>
+                <a:outerShdw blurRad="60007" dist="310007" dir="7680000" sy="30000" kx="1300200" algn="ctr" rotWithShape="0">
+                  <a:prstClr val="black">
+                    <a:alpha val="13000"/>
+                  </a:prstClr>
+                </a:outerShdw>
+              </a:effectLst>
+            </a:endParaRPr>
+          </a:p>
+        </p:txBody>
+      </p:sp>
+      <p:sp>
+        <p:nvSpPr>
+          <p:cNvPr id="7" name="Inhaltsplatzhalter 4">
+            <a:extLst>
+              <a:ext uri="{FF2B5EF4-FFF2-40B4-BE49-F238E27FC236}">
+                <a16:creationId xmlns:a16="http://schemas.microsoft.com/office/drawing/2014/main" id="{52C985F3-3574-87BE-0A89-49EBBEF3CAE7}"/>
+              </a:ext>
+            </a:extLst>
+          </p:cNvPr>
+          <p:cNvSpPr txBox="1">
+            <a:spLocks/>
+          </p:cNvSpPr>
+          <p:nvPr/>
+        </p:nvSpPr>
+        <p:spPr>
+          <a:xfrm>
+            <a:off x="1702341" y="3028950"/>
+            <a:ext cx="5791200" cy="774571"/>
+          </a:xfrm>
+          <a:prstGeom prst="rect">
+            <a:avLst/>
+          </a:prstGeom>
+        </p:spPr>
+        <p:txBody>
+          <a:bodyPr wrap="square" lIns="0" tIns="0" rIns="0" bIns="0">
+            <a:spAutoFit/>
+          </a:bodyPr>
+          <a:lstStyle>
+            <a:lvl1pPr marL="272967" indent="-272967" algn="l" defTabSz="914127" rtl="0" eaLnBrk="1" latinLnBrk="0" hangingPunct="1">
+              <a:lnSpc>
+                <a:spcPct val="90000"/>
+              </a:lnSpc>
+              <a:spcBef>
+                <a:spcPts val="0"/>
+              </a:spcBef>
+              <a:spcAft>
+                <a:spcPts val="1000"/>
+              </a:spcAft>
+              <a:buFont typeface="Wingdings" panose="05000000000000000000" pitchFamily="2" charset="2"/>
+              <a:buChar char="§"/>
+              <a:defRPr sz="2300" kern="1200">
+                <a:solidFill>
+                  <a:schemeClr val="bg1"/>
+                </a:solidFill>
+                <a:latin typeface="Calibri Light" panose="020F0302020204030204" pitchFamily="34" charset="0"/>
+                <a:ea typeface="+mn-ea"/>
+                <a:cs typeface="+mn-cs"/>
+              </a:defRPr>
+            </a:lvl1pPr>
+            <a:lvl2pPr marL="807798" indent="-272967" algn="l" defTabSz="914127" rtl="0" eaLnBrk="1" latinLnBrk="0" hangingPunct="1">
+              <a:lnSpc>
+                <a:spcPct val="90000"/>
+              </a:lnSpc>
+              <a:spcBef>
+                <a:spcPts val="0"/>
+              </a:spcBef>
+              <a:spcAft>
+                <a:spcPts val="1000"/>
+              </a:spcAft>
+              <a:buFont typeface="Symbol" panose="05050102010706020507" pitchFamily="18" charset="2"/>
+              <a:buChar char="-"/>
+              <a:defRPr sz="2000" kern="1200">
+                <a:solidFill>
+                  <a:schemeClr val="bg1"/>
+                </a:solidFill>
+                <a:latin typeface="Calibri Light" panose="020F0302020204030204" pitchFamily="34" charset="0"/>
+                <a:ea typeface="+mn-ea"/>
+                <a:cs typeface="+mn-cs"/>
+              </a:defRPr>
+            </a:lvl2pPr>
+            <a:lvl3pPr marL="1080764" indent="-177748" algn="l" defTabSz="914127" rtl="0" eaLnBrk="1" latinLnBrk="0" hangingPunct="1">
+              <a:lnSpc>
+                <a:spcPct val="90000"/>
+              </a:lnSpc>
+              <a:spcBef>
+                <a:spcPts val="0"/>
+              </a:spcBef>
+              <a:spcAft>
+                <a:spcPts val="1000"/>
+              </a:spcAft>
+              <a:buFont typeface="Symbol" panose="05050102010706020507" pitchFamily="18" charset="2"/>
+              <a:buChar char="-"/>
+              <a:defRPr sz="1900" kern="1200">
+                <a:solidFill>
+                  <a:schemeClr val="bg1"/>
+                </a:solidFill>
+                <a:latin typeface="Calibri Light" panose="020F0302020204030204" pitchFamily="34" charset="0"/>
+                <a:ea typeface="+mn-ea"/>
+                <a:cs typeface="+mn-cs"/>
+              </a:defRPr>
+            </a:lvl3pPr>
+            <a:lvl4pPr marL="1436256" indent="-177748" algn="l" defTabSz="914127" rtl="0" eaLnBrk="1" latinLnBrk="0" hangingPunct="1">
+              <a:lnSpc>
+                <a:spcPct val="90000"/>
+              </a:lnSpc>
+              <a:spcBef>
+                <a:spcPts val="0"/>
+              </a:spcBef>
+              <a:spcAft>
+                <a:spcPts val="1000"/>
+              </a:spcAft>
+              <a:buFont typeface="Symbol" panose="05050102010706020507" pitchFamily="18" charset="2"/>
+              <a:buChar char="-"/>
+              <a:defRPr sz="1600" kern="1200">
+                <a:solidFill>
+                  <a:schemeClr val="bg1"/>
+                </a:solidFill>
+                <a:latin typeface="Calibri Light" panose="020F0302020204030204" pitchFamily="34" charset="0"/>
+                <a:ea typeface="+mn-ea"/>
+                <a:cs typeface="+mn-cs"/>
+              </a:defRPr>
+            </a:lvl4pPr>
+            <a:lvl5pPr marL="1793335" indent="-179335" algn="l" defTabSz="914127" rtl="0" eaLnBrk="1" latinLnBrk="0" hangingPunct="1">
+              <a:lnSpc>
+                <a:spcPct val="90000"/>
+              </a:lnSpc>
+              <a:spcBef>
+                <a:spcPts val="0"/>
+              </a:spcBef>
+              <a:spcAft>
+                <a:spcPts val="1000"/>
+              </a:spcAft>
+              <a:buFont typeface="Symbol" panose="05050102010706020507" pitchFamily="18" charset="2"/>
+              <a:buChar char="-"/>
+              <a:defRPr sz="1600" kern="1200">
+                <a:solidFill>
+                  <a:schemeClr val="bg1"/>
+                </a:solidFill>
+                <a:latin typeface="Calibri Light" panose="020F0302020204030204" pitchFamily="34" charset="0"/>
+                <a:ea typeface="+mn-ea"/>
+                <a:cs typeface="+mn-cs"/>
+              </a:defRPr>
+            </a:lvl5pPr>
+            <a:lvl6pPr marL="2513847" indent="-228532" algn="l" defTabSz="914127" rtl="0" eaLnBrk="1" latinLnBrk="0" hangingPunct="1">
+              <a:spcBef>
+                <a:spcPct val="20000"/>
+              </a:spcBef>
+              <a:buFont typeface="Arial" panose="020B0604020202020204" pitchFamily="34" charset="0"/>
+              <a:buChar char="•"/>
+              <a:defRPr sz="2000" kern="1200">
+                <a:solidFill>
+                  <a:schemeClr val="tx1"/>
+                </a:solidFill>
+                <a:latin typeface="+mn-lt"/>
+                <a:ea typeface="+mn-ea"/>
+                <a:cs typeface="+mn-cs"/>
+              </a:defRPr>
+            </a:lvl6pPr>
+            <a:lvl7pPr marL="2970910" indent="-228532" algn="l" defTabSz="914127" rtl="0" eaLnBrk="1" latinLnBrk="0" hangingPunct="1">
+              <a:spcBef>
+                <a:spcPct val="20000"/>
+              </a:spcBef>
+              <a:buFont typeface="Arial" panose="020B0604020202020204" pitchFamily="34" charset="0"/>
+              <a:buChar char="•"/>
+              <a:defRPr sz="2000" kern="1200">
+                <a:solidFill>
+                  <a:schemeClr val="tx1"/>
+                </a:solidFill>
+                <a:latin typeface="+mn-lt"/>
+                <a:ea typeface="+mn-ea"/>
+                <a:cs typeface="+mn-cs"/>
+              </a:defRPr>
+            </a:lvl7pPr>
+            <a:lvl8pPr marL="3427972" indent="-228532" algn="l" defTabSz="914127" rtl="0" eaLnBrk="1" latinLnBrk="0" hangingPunct="1">
+              <a:spcBef>
+                <a:spcPct val="20000"/>
+              </a:spcBef>
+              <a:buFont typeface="Arial" panose="020B0604020202020204" pitchFamily="34" charset="0"/>
+              <a:buChar char="•"/>
+              <a:defRPr sz="2000" kern="1200">
+                <a:solidFill>
+                  <a:schemeClr val="tx1"/>
+                </a:solidFill>
+                <a:latin typeface="+mn-lt"/>
+                <a:ea typeface="+mn-ea"/>
+                <a:cs typeface="+mn-cs"/>
+              </a:defRPr>
+            </a:lvl8pPr>
+            <a:lvl9pPr marL="3885034" indent="-228532" algn="l" defTabSz="914127" rtl="0" eaLnBrk="1" latinLnBrk="0" hangingPunct="1">
+              <a:spcBef>
+                <a:spcPct val="20000"/>
+              </a:spcBef>
+              <a:buFont typeface="Arial" panose="020B0604020202020204" pitchFamily="34" charset="0"/>
+              <a:buChar char="•"/>
+              <a:defRPr sz="2000" kern="1200">
+                <a:solidFill>
+                  <a:schemeClr val="tx1"/>
+                </a:solidFill>
+                <a:latin typeface="+mn-lt"/>
+                <a:ea typeface="+mn-ea"/>
+                <a:cs typeface="+mn-cs"/>
+              </a:defRPr>
+            </a:lvl9pPr>
+          </a:lstStyle>
+          <a:p>
+            <a:pPr marL="0" indent="0" algn="ctr">
+              <a:lnSpc>
+                <a:spcPct val="150000"/>
+              </a:lnSpc>
+              <a:spcAft>
+                <a:spcPts val="600"/>
+              </a:spcAft>
+              <a:buNone/>
+            </a:pPr>
+            <a:r>
+              <a:rPr lang="en-US" sz="1600" dirty="0">
+                <a:latin typeface="+mj-lt"/>
+              </a:rPr>
+              <a:t>Jia Niu, Xiaolin Feng, Tianrui Xie, Zhilin Liu, </a:t>
+            </a:r>
+            <a:r>
+              <a:rPr lang="en-US" sz="1600" dirty="0" err="1">
+                <a:latin typeface="+mj-lt"/>
+              </a:rPr>
+              <a:t>Tianyue</a:t>
+            </a:r>
+            <a:r>
+              <a:rPr lang="en-US" sz="1600" dirty="0">
+                <a:latin typeface="+mj-lt"/>
+              </a:rPr>
+              <a:t> Wang </a:t>
+            </a:r>
+          </a:p>
+          <a:p>
+            <a:pPr marL="0" indent="0" algn="ctr">
+              <a:lnSpc>
+                <a:spcPct val="150000"/>
+              </a:lnSpc>
+              <a:spcAft>
+                <a:spcPts val="600"/>
+              </a:spcAft>
+              <a:buNone/>
+            </a:pPr>
+            <a:r>
+              <a:rPr lang="en-US" sz="1600" dirty="0">
+                <a:latin typeface="+mj-lt"/>
+              </a:rPr>
+              <a:t>GROUP-14</a:t>
+            </a:r>
+          </a:p>
+        </p:txBody>
+      </p:sp>
+      <p:pic>
+        <p:nvPicPr>
+          <p:cNvPr id="2" name="图片 1">
+            <a:extLst>
+              <a:ext uri="{FF2B5EF4-FFF2-40B4-BE49-F238E27FC236}">
+                <a16:creationId xmlns:a16="http://schemas.microsoft.com/office/drawing/2014/main" id="{0F722A01-B91B-C256-8C92-DDEBDF933168}"/>
+              </a:ext>
+            </a:extLst>
+          </p:cNvPr>
+          <p:cNvPicPr>
+            <a:picLocks noChangeAspect="1"/>
+          </p:cNvPicPr>
+          <p:nvPr/>
+        </p:nvPicPr>
+        <p:blipFill>
+          <a:blip r:embed="rId2"/>
+          <a:stretch>
+            <a:fillRect/>
+          </a:stretch>
+        </p:blipFill>
+        <p:spPr>
+          <a:xfrm>
+            <a:off x="398834" y="305511"/>
+            <a:ext cx="1844182" cy="589839"/>
+          </a:xfrm>
+          <a:prstGeom prst="rect">
+            <a:avLst/>
+          </a:prstGeom>
+        </p:spPr>
+      </p:pic>
+    </p:spTree>
+    <p:extLst>
+      <p:ext uri="{BB962C8B-B14F-4D97-AF65-F5344CB8AC3E}">
+        <p14:creationId xmlns:p14="http://schemas.microsoft.com/office/powerpoint/2010/main" val="156321726"/>
+      </p:ext>
+    </p:extLst>
+  </p:cSld>
+  <p:clrMapOvr>
+    <a:masterClrMapping/>
+  </p:clrMapOvr>
+  <p:transition spd="slow">
+    <p:push dir="u"/>
+  </p:transition>
+  <p:timing>
+    <p:tnLst>
+      <p:par>
+        <p:cTn id="1" dur="indefinite" restart="never" nodeType="tmRoot">
+          <p:childTnLst>
+            <p:seq concurrent="1" nextAc="seek">
+              <p:cTn id="2" dur="indefinite" nodeType="mainSeq">
+                <p:childTnLst>
+                  <p:par>
+                    <p:cTn id="3" fill="hold">
+                      <p:stCondLst>
+                        <p:cond delay="indefinite"/>
+                        <p:cond evt="onBegin" delay="0">
+                          <p:tn val="2"/>
+                        </p:cond>
+                      </p:stCondLst>
+                      <p:childTnLst>
+                        <p:par>
+                          <p:cTn id="4" fill="hold">
+                            <p:stCondLst>
+                              <p:cond delay="0"/>
+                            </p:stCondLst>
+                            <p:childTnLst>
+                              <p:par>
+                                <p:cTn id="5" presetID="2" presetClass="entr" presetSubtype="4" accel="20000" decel="60000" fill="hold" grpId="0" nodeType="withEffect">
+                                  <p:stCondLst>
+                                    <p:cond delay="0"/>
+                                  </p:stCondLst>
+                                  <p:iterate type="wd">
+                                    <p:tmPct val="10000"/>
+                                  </p:iterate>
+                                  <p:childTnLst>
+                                    <p:set>
+                                      <p:cBhvr>
+                                        <p:cTn id="6" dur="1" fill="hold">
+                                          <p:stCondLst>
+                                            <p:cond delay="0"/>
+                                          </p:stCondLst>
+                                        </p:cTn>
+                                        <p:tgtEl>
+                                          <p:spTgt spid="4"/>
+                                        </p:tgtEl>
+                                        <p:attrNameLst>
+                                          <p:attrName>style.visibility</p:attrName>
+                                        </p:attrNameLst>
+                                      </p:cBhvr>
+                                      <p:to>
+                                        <p:strVal val="visible"/>
+                                      </p:to>
+                                    </p:set>
+                                    <p:anim calcmode="lin" valueType="num">
+                                      <p:cBhvr additive="base">
+                                        <p:cTn id="7" dur="500" fill="hold"/>
+                                        <p:tgtEl>
+                                          <p:spTgt spid="4"/>
+                                        </p:tgtEl>
+                                        <p:attrNameLst>
+                                          <p:attrName>ppt_x</p:attrName>
+                                        </p:attrNameLst>
+                                      </p:cBhvr>
+                                      <p:tavLst>
+                                        <p:tav tm="0">
+                                          <p:val>
+                                            <p:strVal val="#ppt_x"/>
+                                          </p:val>
+                                        </p:tav>
+                                        <p:tav tm="100000">
+                                          <p:val>
+                                            <p:strVal val="#ppt_x"/>
+                                          </p:val>
+                                        </p:tav>
+                                      </p:tavLst>
+                                    </p:anim>
+                                    <p:anim calcmode="lin" valueType="num">
+                                      <p:cBhvr additive="base">
+                                        <p:cTn id="8" dur="500" fill="hold"/>
+                                        <p:tgtEl>
+                                          <p:spTgt spid="4"/>
+                                        </p:tgtEl>
+                                        <p:attrNameLst>
+                                          <p:attrName>ppt_y</p:attrName>
+                                        </p:attrNameLst>
+                                      </p:cBhvr>
+                                      <p:tavLst>
+                                        <p:tav tm="0">
+                                          <p:val>
+                                            <p:strVal val="1+#ppt_h/2"/>
+                                          </p:val>
+                                        </p:tav>
+                                        <p:tav tm="100000">
+                                          <p:val>
+                                            <p:strVal val="#ppt_y"/>
+                                          </p:val>
+                                        </p:tav>
+                                      </p:tavLst>
+                                    </p:anim>
+                                  </p:childTnLst>
+                                </p:cTn>
+                              </p:par>
+                              <p:par>
+                                <p:cTn id="9" presetID="16" presetClass="entr" presetSubtype="37" fill="hold" grpId="0" nodeType="withEffect">
+                                  <p:stCondLst>
+                                    <p:cond delay="500"/>
+                                  </p:stCondLst>
+                                  <p:childTnLst>
+                                    <p:set>
+                                      <p:cBhvr>
+                                        <p:cTn id="10" dur="1" fill="hold">
+                                          <p:stCondLst>
+                                            <p:cond delay="0"/>
+                                          </p:stCondLst>
+                                        </p:cTn>
+                                        <p:tgtEl>
+                                          <p:spTgt spid="7"/>
+                                        </p:tgtEl>
+                                        <p:attrNameLst>
+                                          <p:attrName>style.visibility</p:attrName>
+                                        </p:attrNameLst>
+                                      </p:cBhvr>
+                                      <p:to>
+                                        <p:strVal val="visible"/>
+                                      </p:to>
+                                    </p:set>
+                                    <p:animEffect transition="in" filter="barn(outVertical)">
+                                      <p:cBhvr>
+                                        <p:cTn id="11" dur="500"/>
+                                        <p:tgtEl>
+                                          <p:spTgt spid="7"/>
+                                        </p:tgtEl>
+                                      </p:cBhvr>
+                                    </p:animEffect>
+                                  </p:childTnLst>
+                                </p:cTn>
+                              </p:par>
+                            </p:childTnLst>
+                          </p:cTn>
+                        </p:par>
+                      </p:childTnLst>
+                    </p:cTn>
+                  </p:par>
+                </p:childTnLst>
+              </p:cTn>
+              <p:prevCondLst>
+                <p:cond evt="onPrev" delay="0">
+                  <p:tgtEl>
+                    <p:sldTgt/>
+                  </p:tgtEl>
+                </p:cond>
+              </p:prevCondLst>
+              <p:nextCondLst>
+                <p:cond evt="onNext" delay="0">
+                  <p:tgtEl>
+                    <p:sldTgt/>
+                  </p:tgtEl>
+                </p:cond>
+              </p:nextCondLst>
+            </p:seq>
+          </p:childTnLst>
+        </p:cTn>
+      </p:par>
+    </p:tnLst>
+    <p:bldLst>
+      <p:bldP spid="4" grpId="0"/>
+      <p:bldP spid="7" grpId="0"/>
+    </p:bldLst>
+  </p:timing>
 </p:sld>
 </file>
 

</xml_diff>